<commit_message>
Not sure what I've changed. Been a while since I've done anythiny to it. Uses the FreeRTOS core now, and it does compile. I've not tested the latest copy on the hardware
</commit_message>
<xml_diff>
--- a/docs/Master PCB Block diagram (08.12.17).pptx
+++ b/docs/Master PCB Block diagram (08.12.17).pptx
@@ -113,8 +113,41 @@
 </p:presentation>
 </file>
 
-<file path=ppt/revisionInfo.xml><?xml version="1.0" encoding="utf-8"?>
-<p1510:revInfo xmlns:a="http://schemas.openxmlformats.org/drawingml/2006/main" xmlns:r="http://schemas.openxmlformats.org/officeDocument/2006/relationships" xmlns:p1510="http://schemas.microsoft.com/office/powerpoint/2015/10/main"/>
+<file path=ppt/changesInfos/changesInfo1.xml><?xml version="1.0" encoding="utf-8"?>
+<pc:chgInfo xmlns:a="http://schemas.openxmlformats.org/drawingml/2006/main" xmlns:r="http://schemas.openxmlformats.org/officeDocument/2006/relationships" xmlns:ac="http://schemas.microsoft.com/office/drawing/2013/main/command" xmlns:pc="http://schemas.microsoft.com/office/powerpoint/2013/main/command">
+  <pc:docChgLst>
+    <pc:chgData name="E F" userId="333ebb87f0aaab10" providerId="LiveId" clId="{A3DCAAA8-3037-469D-BD12-148202671023}"/>
+    <pc:docChg chg="custSel modSld">
+      <pc:chgData name="E F" userId="333ebb87f0aaab10" providerId="LiveId" clId="{A3DCAAA8-3037-469D-BD12-148202671023}" dt="2018-04-24T22:31:15.275" v="1" actId="478"/>
+      <pc:docMkLst>
+        <pc:docMk/>
+      </pc:docMkLst>
+      <pc:sldChg chg="delSp">
+        <pc:chgData name="E F" userId="333ebb87f0aaab10" providerId="LiveId" clId="{A3DCAAA8-3037-469D-BD12-148202671023}" dt="2018-04-24T22:31:15.275" v="1" actId="478"/>
+        <pc:sldMkLst>
+          <pc:docMk/>
+          <pc:sldMk cId="969670899" sldId="256"/>
+        </pc:sldMkLst>
+        <pc:spChg chg="del">
+          <ac:chgData name="E F" userId="333ebb87f0aaab10" providerId="LiveId" clId="{A3DCAAA8-3037-469D-BD12-148202671023}" dt="2018-04-24T22:31:14.463" v="0" actId="478"/>
+          <ac:spMkLst>
+            <pc:docMk/>
+            <pc:sldMk cId="969670899" sldId="256"/>
+            <ac:spMk id="25" creationId="{1CA72DA0-43F7-4FF9-AFD8-952F193E802D}"/>
+          </ac:spMkLst>
+        </pc:spChg>
+        <pc:spChg chg="del">
+          <ac:chgData name="E F" userId="333ebb87f0aaab10" providerId="LiveId" clId="{A3DCAAA8-3037-469D-BD12-148202671023}" dt="2018-04-24T22:31:15.275" v="1" actId="478"/>
+          <ac:spMkLst>
+            <pc:docMk/>
+            <pc:sldMk cId="969670899" sldId="256"/>
+            <ac:spMk id="217" creationId="{865BF13F-68ED-40FB-9BBA-1B19E98CA4B6}"/>
+          </ac:spMkLst>
+        </pc:spChg>
+      </pc:sldChg>
+    </pc:docChg>
+  </pc:docChgLst>
+</pc:chgInfo>
 </file>
 
 <file path=ppt/slideLayouts/slideLayout1.xml><?xml version="1.0" encoding="utf-8"?>
@@ -248,7 +281,7 @@
           <a:p>
             <a:fld id="{E4538CB3-FA34-4559-A5DA-922F8E1D96FC}" type="datetimeFigureOut">
               <a:rPr lang="en-GB" smtClean="0"/>
-              <a:t>08/12/2017</a:t>
+              <a:t>24/04/2018</a:t>
             </a:fld>
             <a:endParaRPr lang="en-GB"/>
           </a:p>
@@ -418,7 +451,7 @@
           <a:p>
             <a:fld id="{E4538CB3-FA34-4559-A5DA-922F8E1D96FC}" type="datetimeFigureOut">
               <a:rPr lang="en-GB" smtClean="0"/>
-              <a:t>08/12/2017</a:t>
+              <a:t>24/04/2018</a:t>
             </a:fld>
             <a:endParaRPr lang="en-GB"/>
           </a:p>
@@ -598,7 +631,7 @@
           <a:p>
             <a:fld id="{E4538CB3-FA34-4559-A5DA-922F8E1D96FC}" type="datetimeFigureOut">
               <a:rPr lang="en-GB" smtClean="0"/>
-              <a:t>08/12/2017</a:t>
+              <a:t>24/04/2018</a:t>
             </a:fld>
             <a:endParaRPr lang="en-GB"/>
           </a:p>
@@ -768,7 +801,7 @@
           <a:p>
             <a:fld id="{E4538CB3-FA34-4559-A5DA-922F8E1D96FC}" type="datetimeFigureOut">
               <a:rPr lang="en-GB" smtClean="0"/>
-              <a:t>08/12/2017</a:t>
+              <a:t>24/04/2018</a:t>
             </a:fld>
             <a:endParaRPr lang="en-GB"/>
           </a:p>
@@ -1012,7 +1045,7 @@
           <a:p>
             <a:fld id="{E4538CB3-FA34-4559-A5DA-922F8E1D96FC}" type="datetimeFigureOut">
               <a:rPr lang="en-GB" smtClean="0"/>
-              <a:t>08/12/2017</a:t>
+              <a:t>24/04/2018</a:t>
             </a:fld>
             <a:endParaRPr lang="en-GB"/>
           </a:p>
@@ -1244,7 +1277,7 @@
           <a:p>
             <a:fld id="{E4538CB3-FA34-4559-A5DA-922F8E1D96FC}" type="datetimeFigureOut">
               <a:rPr lang="en-GB" smtClean="0"/>
-              <a:t>08/12/2017</a:t>
+              <a:t>24/04/2018</a:t>
             </a:fld>
             <a:endParaRPr lang="en-GB"/>
           </a:p>
@@ -1611,7 +1644,7 @@
           <a:p>
             <a:fld id="{E4538CB3-FA34-4559-A5DA-922F8E1D96FC}" type="datetimeFigureOut">
               <a:rPr lang="en-GB" smtClean="0"/>
-              <a:t>08/12/2017</a:t>
+              <a:t>24/04/2018</a:t>
             </a:fld>
             <a:endParaRPr lang="en-GB"/>
           </a:p>
@@ -1729,7 +1762,7 @@
           <a:p>
             <a:fld id="{E4538CB3-FA34-4559-A5DA-922F8E1D96FC}" type="datetimeFigureOut">
               <a:rPr lang="en-GB" smtClean="0"/>
-              <a:t>08/12/2017</a:t>
+              <a:t>24/04/2018</a:t>
             </a:fld>
             <a:endParaRPr lang="en-GB"/>
           </a:p>
@@ -1824,7 +1857,7 @@
           <a:p>
             <a:fld id="{E4538CB3-FA34-4559-A5DA-922F8E1D96FC}" type="datetimeFigureOut">
               <a:rPr lang="en-GB" smtClean="0"/>
-              <a:t>08/12/2017</a:t>
+              <a:t>24/04/2018</a:t>
             </a:fld>
             <a:endParaRPr lang="en-GB"/>
           </a:p>
@@ -2101,7 +2134,7 @@
           <a:p>
             <a:fld id="{E4538CB3-FA34-4559-A5DA-922F8E1D96FC}" type="datetimeFigureOut">
               <a:rPr lang="en-GB" smtClean="0"/>
-              <a:t>08/12/2017</a:t>
+              <a:t>24/04/2018</a:t>
             </a:fld>
             <a:endParaRPr lang="en-GB"/>
           </a:p>
@@ -2358,7 +2391,7 @@
           <a:p>
             <a:fld id="{E4538CB3-FA34-4559-A5DA-922F8E1D96FC}" type="datetimeFigureOut">
               <a:rPr lang="en-GB" smtClean="0"/>
-              <a:t>08/12/2017</a:t>
+              <a:t>24/04/2018</a:t>
             </a:fld>
             <a:endParaRPr lang="en-GB"/>
           </a:p>
@@ -2571,7 +2604,7 @@
           <a:p>
             <a:fld id="{E4538CB3-FA34-4559-A5DA-922F8E1D96FC}" type="datetimeFigureOut">
               <a:rPr lang="en-GB" smtClean="0"/>
-              <a:t>08/12/2017</a:t>
+              <a:t>24/04/2018</a:t>
             </a:fld>
             <a:endParaRPr lang="en-GB"/>
           </a:p>
@@ -10117,106 +10150,6 @@
       </p:sp>
       <p:sp>
         <p:nvSpPr>
-          <p:cNvPr id="25" name="Rectangle 24">
-            <a:extLst>
-              <a:ext uri="{FF2B5EF4-FFF2-40B4-BE49-F238E27FC236}">
-                <a16:creationId xmlns:a16="http://schemas.microsoft.com/office/drawing/2014/main" id="{1CA72DA0-43F7-4FF9-AFD8-952F193E802D}"/>
-              </a:ext>
-            </a:extLst>
-          </p:cNvPr>
-          <p:cNvSpPr/>
-          <p:nvPr/>
-        </p:nvSpPr>
-        <p:spPr>
-          <a:xfrm>
-            <a:off x="18949321" y="7115247"/>
-            <a:ext cx="3544919" cy="1194942"/>
-          </a:xfrm>
-          <a:prstGeom prst="rect">
-            <a:avLst/>
-          </a:prstGeom>
-          <a:noFill/>
-          <a:ln w="76200">
-            <a:solidFill>
-              <a:srgbClr val="FF0000"/>
-            </a:solidFill>
-          </a:ln>
-        </p:spPr>
-        <p:style>
-          <a:lnRef idx="2">
-            <a:schemeClr val="accent2"/>
-          </a:lnRef>
-          <a:fillRef idx="1">
-            <a:schemeClr val="lt1"/>
-          </a:fillRef>
-          <a:effectRef idx="0">
-            <a:schemeClr val="accent2"/>
-          </a:effectRef>
-          <a:fontRef idx="minor">
-            <a:schemeClr val="dk1"/>
-          </a:fontRef>
-        </p:style>
-        <p:txBody>
-          <a:bodyPr rtlCol="0" anchor="ctr"/>
-          <a:lstStyle/>
-          <a:p>
-            <a:pPr algn="ctr"/>
-            <a:endParaRPr lang="en-GB" dirty="0"/>
-          </a:p>
-        </p:txBody>
-      </p:sp>
-      <p:sp>
-        <p:nvSpPr>
-          <p:cNvPr id="217" name="Rectangle 216">
-            <a:extLst>
-              <a:ext uri="{FF2B5EF4-FFF2-40B4-BE49-F238E27FC236}">
-                <a16:creationId xmlns:a16="http://schemas.microsoft.com/office/drawing/2014/main" id="{865BF13F-68ED-40FB-9BBA-1B19E98CA4B6}"/>
-              </a:ext>
-            </a:extLst>
-          </p:cNvPr>
-          <p:cNvSpPr/>
-          <p:nvPr/>
-        </p:nvSpPr>
-        <p:spPr>
-          <a:xfrm>
-            <a:off x="22559389" y="8850878"/>
-            <a:ext cx="7715824" cy="3933358"/>
-          </a:xfrm>
-          <a:prstGeom prst="rect">
-            <a:avLst/>
-          </a:prstGeom>
-          <a:noFill/>
-          <a:ln w="76200">
-            <a:solidFill>
-              <a:srgbClr val="FF0000"/>
-            </a:solidFill>
-          </a:ln>
-        </p:spPr>
-        <p:style>
-          <a:lnRef idx="2">
-            <a:schemeClr val="accent2"/>
-          </a:lnRef>
-          <a:fillRef idx="1">
-            <a:schemeClr val="lt1"/>
-          </a:fillRef>
-          <a:effectRef idx="0">
-            <a:schemeClr val="accent2"/>
-          </a:effectRef>
-          <a:fontRef idx="minor">
-            <a:schemeClr val="dk1"/>
-          </a:fontRef>
-        </p:style>
-        <p:txBody>
-          <a:bodyPr rtlCol="0" anchor="ctr"/>
-          <a:lstStyle/>
-          <a:p>
-            <a:pPr algn="ctr"/>
-            <a:endParaRPr lang="en-GB" dirty="0"/>
-          </a:p>
-        </p:txBody>
-      </p:sp>
-      <p:sp>
-        <p:nvSpPr>
           <p:cNvPr id="27" name="TextBox 26">
             <a:extLst>
               <a:ext uri="{FF2B5EF4-FFF2-40B4-BE49-F238E27FC236}">

</xml_diff>